<commit_message>
Final Presentation-Data analysis Project SS22
Correction from Bonferrori correction
</commit_message>
<xml_diff>
--- a/final/Data Analysis Project SS22_Final Presentation_Topic 3_Team 4.pptx
+++ b/final/Data Analysis Project SS22_Final Presentation_Topic 3_Team 4.pptx
@@ -7661,10 +7661,10 @@
       </p:sp>
       <p:pic>
         <p:nvPicPr>
-          <p:cNvPr id="9" name="Grafik 8" descr="Ein Bild, das Text enthält.&#10;&#10;Automatisch generierte Beschreibung">
+          <p:cNvPr id="8" name="Grafik 7" descr="Ein Bild, das Text, Tisch enthält.&#10;&#10;Automatisch generierte Beschreibung">
             <a:extLst>
               <a:ext uri="{FF2B5EF4-FFF2-40B4-BE49-F238E27FC236}">
-                <a16:creationId xmlns:a16="http://schemas.microsoft.com/office/drawing/2014/main" id="{6F986637-271A-96F0-8AAF-59A57FBDB0D0}"/>
+                <a16:creationId xmlns:a16="http://schemas.microsoft.com/office/drawing/2014/main" id="{800A379D-A91A-EC00-23B1-5FE4C83163A0}"/>
               </a:ext>
             </a:extLst>
           </p:cNvPr>
@@ -7687,8 +7687,8 @@
         </p:blipFill>
         <p:spPr>
           <a:xfrm>
-            <a:off x="1531089" y="2038159"/>
-            <a:ext cx="7412886" cy="4095357"/>
+            <a:off x="2328939" y="2105836"/>
+            <a:ext cx="7790154" cy="4027864"/>
           </a:xfrm>
           <a:prstGeom prst="rect">
             <a:avLst/>

</xml_diff>